<commit_message>
Update for Eq. plot labels
</commit_message>
<xml_diff>
--- a/MeadPowellPlots/PowellMeadReanalysisPlots.pptx
+++ b/MeadPowellPlots/PowellMeadReanalysisPlots.pptx
@@ -4305,10 +4305,10 @@
       </p:sp>
       <p:pic>
         <p:nvPicPr>
-          <p:cNvPr id="2" name="Picture 1">
+          <p:cNvPr id="3" name="Picture 2">
             <a:extLst>
               <a:ext uri="{FF2B5EF4-FFF2-40B4-BE49-F238E27FC236}">
-                <a16:creationId xmlns:a16="http://schemas.microsoft.com/office/drawing/2014/main" id="{B44E2C52-6400-4A7E-B396-493735A21A04}"/>
+                <a16:creationId xmlns:a16="http://schemas.microsoft.com/office/drawing/2014/main" id="{E4B8BF8E-4F4A-44AA-8EFF-A00A780049B6}"/>
               </a:ext>
             </a:extLst>
           </p:cNvPr>
@@ -4319,13 +4319,13 @@
         </p:nvPicPr>
         <p:blipFill rotWithShape="1">
           <a:blip r:embed="rId2"/>
-          <a:srcRect b="8545"/>
+          <a:srcRect b="8403"/>
           <a:stretch/>
         </p:blipFill>
         <p:spPr>
           <a:xfrm>
-            <a:off x="1143000" y="1523999"/>
-            <a:ext cx="6610208" cy="5257041"/>
+            <a:off x="1212307" y="1417319"/>
+            <a:ext cx="6719386" cy="5335577"/>
           </a:xfrm>
           <a:prstGeom prst="rect">
             <a:avLst/>
@@ -4451,10 +4451,10 @@
       </p:sp>
       <p:pic>
         <p:nvPicPr>
-          <p:cNvPr id="2" name="Picture 1">
+          <p:cNvPr id="7" name="Picture 6">
             <a:extLst>
               <a:ext uri="{FF2B5EF4-FFF2-40B4-BE49-F238E27FC236}">
-                <a16:creationId xmlns:a16="http://schemas.microsoft.com/office/drawing/2014/main" id="{9A35E44A-2398-4E21-B258-5FC0CC15DDF4}"/>
+                <a16:creationId xmlns:a16="http://schemas.microsoft.com/office/drawing/2014/main" id="{AA1A414F-0307-4D92-9BCB-37094F9AB68D}"/>
               </a:ext>
             </a:extLst>
           </p:cNvPr>
@@ -4463,15 +4463,16 @@
           </p:cNvPicPr>
           <p:nvPr/>
         </p:nvPicPr>
-        <p:blipFill rotWithShape="1">
+        <p:blipFill>
           <a:blip r:embed="rId2"/>
-          <a:srcRect b="7778"/>
-          <a:stretch/>
+          <a:stretch>
+            <a:fillRect/>
+          </a:stretch>
         </p:blipFill>
         <p:spPr>
           <a:xfrm>
-            <a:off x="1066800" y="1219200"/>
-            <a:ext cx="7010400" cy="5597248"/>
+            <a:off x="1066800" y="1143000"/>
+            <a:ext cx="7161770" cy="5715000"/>
           </a:xfrm>
           <a:prstGeom prst="rect">
             <a:avLst/>
@@ -4613,10 +4614,10 @@
       </p:sp>
       <p:pic>
         <p:nvPicPr>
-          <p:cNvPr id="2" name="Picture 1">
+          <p:cNvPr id="3" name="Picture 2">
             <a:extLst>
               <a:ext uri="{FF2B5EF4-FFF2-40B4-BE49-F238E27FC236}">
-                <a16:creationId xmlns:a16="http://schemas.microsoft.com/office/drawing/2014/main" id="{EA15FD27-32CA-4EA6-B77A-EF2528E0C629}"/>
+                <a16:creationId xmlns:a16="http://schemas.microsoft.com/office/drawing/2014/main" id="{3ED9692C-A142-4BC9-8E97-01699790DC13}"/>
               </a:ext>
             </a:extLst>
           </p:cNvPr>
@@ -4627,13 +4628,13 @@
         </p:nvPicPr>
         <p:blipFill rotWithShape="1">
           <a:blip r:embed="rId2"/>
-          <a:srcRect l="13526" t="3323" r="13974" b="8904"/>
+          <a:srcRect b="7958"/>
           <a:stretch/>
         </p:blipFill>
         <p:spPr>
           <a:xfrm>
-            <a:off x="1181099" y="1447093"/>
-            <a:ext cx="6781801" cy="5378669"/>
+            <a:off x="1298112" y="1524000"/>
+            <a:ext cx="6547775" cy="5222534"/>
           </a:xfrm>
           <a:prstGeom prst="rect">
             <a:avLst/>

</xml_diff>